<commit_message>
minor(frontend): add transgression explanation
</commit_message>
<xml_diff>
--- a/docs/Cubic_Мультимедийная презентация.pptx
+++ b/docs/Cubic_Мультимедийная презентация.pptx
@@ -7,12 +7,13 @@
   <p:sldIdLst>
     <p:sldId id="256" r:id="rId2"/>
     <p:sldId id="257" r:id="rId3"/>
-    <p:sldId id="258" r:id="rId4"/>
-    <p:sldId id="259" r:id="rId5"/>
-    <p:sldId id="263" r:id="rId6"/>
-    <p:sldId id="261" r:id="rId7"/>
-    <p:sldId id="262" r:id="rId8"/>
-    <p:sldId id="264" r:id="rId9"/>
+    <p:sldId id="265" r:id="rId4"/>
+    <p:sldId id="258" r:id="rId5"/>
+    <p:sldId id="259" r:id="rId6"/>
+    <p:sldId id="263" r:id="rId7"/>
+    <p:sldId id="261" r:id="rId8"/>
+    <p:sldId id="262" r:id="rId9"/>
+    <p:sldId id="264" r:id="rId10"/>
   </p:sldIdLst>
   <p:sldSz cx="12192000" cy="6858000"/>
   <p:notesSz cx="6858000" cy="9144000"/>
@@ -266,7 +267,7 @@
           <a:p>
             <a:fld id="{6F633643-D9F4-46E5-AA51-47D5A14155AB}" type="datetimeFigureOut">
               <a:rPr lang="ru-RU" smtClean="0"/>
-              <a:t>28.02.2023</a:t>
+              <a:t>18.04.2023</a:t>
             </a:fld>
             <a:endParaRPr lang="ru-RU"/>
           </a:p>
@@ -464,7 +465,7 @@
           <a:p>
             <a:fld id="{6F633643-D9F4-46E5-AA51-47D5A14155AB}" type="datetimeFigureOut">
               <a:rPr lang="ru-RU" smtClean="0"/>
-              <a:t>28.02.2023</a:t>
+              <a:t>18.04.2023</a:t>
             </a:fld>
             <a:endParaRPr lang="ru-RU"/>
           </a:p>
@@ -672,7 +673,7 @@
           <a:p>
             <a:fld id="{6F633643-D9F4-46E5-AA51-47D5A14155AB}" type="datetimeFigureOut">
               <a:rPr lang="ru-RU" smtClean="0"/>
-              <a:t>28.02.2023</a:t>
+              <a:t>18.04.2023</a:t>
             </a:fld>
             <a:endParaRPr lang="ru-RU"/>
           </a:p>
@@ -870,7 +871,7 @@
           <a:p>
             <a:fld id="{6F633643-D9F4-46E5-AA51-47D5A14155AB}" type="datetimeFigureOut">
               <a:rPr lang="ru-RU" smtClean="0"/>
-              <a:t>28.02.2023</a:t>
+              <a:t>18.04.2023</a:t>
             </a:fld>
             <a:endParaRPr lang="ru-RU"/>
           </a:p>
@@ -1145,7 +1146,7 @@
           <a:p>
             <a:fld id="{6F633643-D9F4-46E5-AA51-47D5A14155AB}" type="datetimeFigureOut">
               <a:rPr lang="ru-RU" smtClean="0"/>
-              <a:t>28.02.2023</a:t>
+              <a:t>18.04.2023</a:t>
             </a:fld>
             <a:endParaRPr lang="ru-RU"/>
           </a:p>
@@ -1410,7 +1411,7 @@
           <a:p>
             <a:fld id="{6F633643-D9F4-46E5-AA51-47D5A14155AB}" type="datetimeFigureOut">
               <a:rPr lang="ru-RU" smtClean="0"/>
-              <a:t>28.02.2023</a:t>
+              <a:t>18.04.2023</a:t>
             </a:fld>
             <a:endParaRPr lang="ru-RU"/>
           </a:p>
@@ -1822,7 +1823,7 @@
           <a:p>
             <a:fld id="{6F633643-D9F4-46E5-AA51-47D5A14155AB}" type="datetimeFigureOut">
               <a:rPr lang="ru-RU" smtClean="0"/>
-              <a:t>28.02.2023</a:t>
+              <a:t>18.04.2023</a:t>
             </a:fld>
             <a:endParaRPr lang="ru-RU"/>
           </a:p>
@@ -1963,7 +1964,7 @@
           <a:p>
             <a:fld id="{6F633643-D9F4-46E5-AA51-47D5A14155AB}" type="datetimeFigureOut">
               <a:rPr lang="ru-RU" smtClean="0"/>
-              <a:t>28.02.2023</a:t>
+              <a:t>18.04.2023</a:t>
             </a:fld>
             <a:endParaRPr lang="ru-RU"/>
           </a:p>
@@ -2076,7 +2077,7 @@
           <a:p>
             <a:fld id="{6F633643-D9F4-46E5-AA51-47D5A14155AB}" type="datetimeFigureOut">
               <a:rPr lang="ru-RU" smtClean="0"/>
-              <a:t>28.02.2023</a:t>
+              <a:t>18.04.2023</a:t>
             </a:fld>
             <a:endParaRPr lang="ru-RU"/>
           </a:p>
@@ -2387,7 +2388,7 @@
           <a:p>
             <a:fld id="{6F633643-D9F4-46E5-AA51-47D5A14155AB}" type="datetimeFigureOut">
               <a:rPr lang="ru-RU" smtClean="0"/>
-              <a:t>28.02.2023</a:t>
+              <a:t>18.04.2023</a:t>
             </a:fld>
             <a:endParaRPr lang="ru-RU"/>
           </a:p>
@@ -2675,7 +2676,7 @@
           <a:p>
             <a:fld id="{6F633643-D9F4-46E5-AA51-47D5A14155AB}" type="datetimeFigureOut">
               <a:rPr lang="ru-RU" smtClean="0"/>
-              <a:t>28.02.2023</a:t>
+              <a:t>18.04.2023</a:t>
             </a:fld>
             <a:endParaRPr lang="ru-RU"/>
           </a:p>
@@ -2916,7 +2917,7 @@
           <a:p>
             <a:fld id="{6F633643-D9F4-46E5-AA51-47D5A14155AB}" type="datetimeFigureOut">
               <a:rPr lang="ru-RU" smtClean="0"/>
-              <a:t>28.02.2023</a:t>
+              <a:t>18.04.2023</a:t>
             </a:fld>
             <a:endParaRPr lang="ru-RU"/>
           </a:p>
@@ -3518,7 +3519,7 @@
         <p:spPr>
           <a:xfrm>
             <a:off x="230790" y="830549"/>
-            <a:ext cx="11912600" cy="830997"/>
+            <a:ext cx="11912600" cy="461665"/>
           </a:xfrm>
           <a:prstGeom prst="rect">
             <a:avLst/>
@@ -3533,7 +3534,7 @@
           <a:p>
             <a:r>
               <a:rPr lang="ru-RU" sz="2400" dirty="0"/>
-              <a:t>Разработать браузерную игру-головоломку, которая поможет человеку в развитии его абстрактного и аналитического мышления, а также позволит приятно провести время.</a:t>
+              <a:t>Разработать продукт, помогающий людям развивать мышление</a:t>
             </a:r>
           </a:p>
         </p:txBody>
@@ -3598,6 +3599,36 @@
           <a:chExt cx="0" cy="0"/>
         </a:xfrm>
       </p:grpSpPr>
+    </p:spTree>
+    <p:extLst>
+      <p:ext uri="{BB962C8B-B14F-4D97-AF65-F5344CB8AC3E}">
+        <p14:creationId xmlns:p14="http://schemas.microsoft.com/office/powerpoint/2010/main" val="634734916"/>
+      </p:ext>
+    </p:extLst>
+  </p:cSld>
+  <p:clrMapOvr>
+    <a:masterClrMapping/>
+  </p:clrMapOvr>
+</p:sld>
+</file>
+
+<file path=ppt/slides/slide4.xml><?xml version="1.0" encoding="utf-8"?>
+<p:sld xmlns:a="http://schemas.openxmlformats.org/drawingml/2006/main" xmlns:r="http://schemas.openxmlformats.org/officeDocument/2006/relationships" xmlns:p="http://schemas.openxmlformats.org/presentationml/2006/main">
+  <p:cSld>
+    <p:spTree>
+      <p:nvGrpSpPr>
+        <p:cNvPr id="1" name=""/>
+        <p:cNvGrpSpPr/>
+        <p:nvPr/>
+      </p:nvGrpSpPr>
+      <p:grpSpPr>
+        <a:xfrm>
+          <a:off x="0" y="0"/>
+          <a:ext cx="0" cy="0"/>
+          <a:chOff x="0" y="0"/>
+          <a:chExt cx="0" cy="0"/>
+        </a:xfrm>
+      </p:grpSpPr>
       <p:sp>
         <p:nvSpPr>
           <p:cNvPr id="2" name="TextBox 1">
@@ -3778,7 +3809,7 @@
 </p:sld>
 </file>
 
-<file path=ppt/slides/slide4.xml><?xml version="1.0" encoding="utf-8"?>
+<file path=ppt/slides/slide5.xml><?xml version="1.0" encoding="utf-8"?>
 <p:sld xmlns:a="http://schemas.openxmlformats.org/drawingml/2006/main" xmlns:r="http://schemas.openxmlformats.org/officeDocument/2006/relationships" xmlns:p="http://schemas.openxmlformats.org/presentationml/2006/main">
   <p:cSld>
     <p:spTree>
@@ -4373,108 +4404,6 @@
 </p:sld>
 </file>
 
-<file path=ppt/slides/slide5.xml><?xml version="1.0" encoding="utf-8"?>
-<p:sld xmlns:a="http://schemas.openxmlformats.org/drawingml/2006/main" xmlns:r="http://schemas.openxmlformats.org/officeDocument/2006/relationships" xmlns:p="http://schemas.openxmlformats.org/presentationml/2006/main">
-  <p:cSld>
-    <p:spTree>
-      <p:nvGrpSpPr>
-        <p:cNvPr id="1" name=""/>
-        <p:cNvGrpSpPr/>
-        <p:nvPr/>
-      </p:nvGrpSpPr>
-      <p:grpSpPr>
-        <a:xfrm>
-          <a:off x="0" y="0"/>
-          <a:ext cx="0" cy="0"/>
-          <a:chOff x="0" y="0"/>
-          <a:chExt cx="0" cy="0"/>
-        </a:xfrm>
-      </p:grpSpPr>
-      <p:sp>
-        <p:nvSpPr>
-          <p:cNvPr id="3" name="Прямоугольник 2">
-            <a:extLst>
-              <a:ext uri="{FF2B5EF4-FFF2-40B4-BE49-F238E27FC236}">
-                <a16:creationId xmlns:a16="http://schemas.microsoft.com/office/drawing/2014/main" id="{1284F120-D1F0-420B-BAC9-F7B9CB6D9FDF}"/>
-              </a:ext>
-            </a:extLst>
-          </p:cNvPr>
-          <p:cNvSpPr/>
-          <p:nvPr/>
-        </p:nvSpPr>
-        <p:spPr>
-          <a:xfrm>
-            <a:off x="139700" y="830549"/>
-            <a:ext cx="3389518" cy="707886"/>
-          </a:xfrm>
-          <a:prstGeom prst="rect">
-            <a:avLst/>
-          </a:prstGeom>
-        </p:spPr>
-        <p:txBody>
-          <a:bodyPr wrap="none">
-            <a:spAutoFit/>
-          </a:bodyPr>
-          <a:lstStyle/>
-          <a:p>
-            <a:r>
-              <a:rPr lang="en-US" sz="4000" dirty="0">
-                <a:hlinkClick r:id="rId2"/>
-              </a:rPr>
-              <a:t>https://cubic.tk</a:t>
-            </a:r>
-            <a:endParaRPr lang="ru-RU" sz="4000" dirty="0"/>
-          </a:p>
-        </p:txBody>
-      </p:sp>
-      <p:sp>
-        <p:nvSpPr>
-          <p:cNvPr id="4" name="TextBox 3">
-            <a:extLst>
-              <a:ext uri="{FF2B5EF4-FFF2-40B4-BE49-F238E27FC236}">
-                <a16:creationId xmlns:a16="http://schemas.microsoft.com/office/drawing/2014/main" id="{4E4FA668-243E-4A8C-978B-4D951CEC2927}"/>
-              </a:ext>
-            </a:extLst>
-          </p:cNvPr>
-          <p:cNvSpPr txBox="1"/>
-          <p:nvPr/>
-        </p:nvSpPr>
-        <p:spPr>
-          <a:xfrm>
-            <a:off x="139700" y="122663"/>
-            <a:ext cx="12192000" cy="707886"/>
-          </a:xfrm>
-          <a:prstGeom prst="rect">
-            <a:avLst/>
-          </a:prstGeom>
-          <a:noFill/>
-        </p:spPr>
-        <p:txBody>
-          <a:bodyPr wrap="square" rtlCol="0">
-            <a:spAutoFit/>
-          </a:bodyPr>
-          <a:lstStyle/>
-          <a:p>
-            <a:r>
-              <a:rPr lang="ru-RU" sz="4000" dirty="0"/>
-              <a:t>Демонстрация</a:t>
-            </a:r>
-          </a:p>
-        </p:txBody>
-      </p:sp>
-    </p:spTree>
-    <p:extLst>
-      <p:ext uri="{BB962C8B-B14F-4D97-AF65-F5344CB8AC3E}">
-        <p14:creationId xmlns:p14="http://schemas.microsoft.com/office/powerpoint/2010/main" val="1371665637"/>
-      </p:ext>
-    </p:extLst>
-  </p:cSld>
-  <p:clrMapOvr>
-    <a:masterClrMapping/>
-  </p:clrMapOvr>
-</p:sld>
-</file>
-
 <file path=ppt/slides/slide6.xml><?xml version="1.0" encoding="utf-8"?>
 <p:sld xmlns:a="http://schemas.openxmlformats.org/drawingml/2006/main" xmlns:r="http://schemas.openxmlformats.org/officeDocument/2006/relationships" xmlns:p="http://schemas.openxmlformats.org/presentationml/2006/main">
   <p:cSld>
@@ -4494,10 +4423,47 @@
       </p:grpSpPr>
       <p:sp>
         <p:nvSpPr>
-          <p:cNvPr id="2" name="TextBox 1">
-            <a:extLst>
-              <a:ext uri="{FF2B5EF4-FFF2-40B4-BE49-F238E27FC236}">
-                <a16:creationId xmlns:a16="http://schemas.microsoft.com/office/drawing/2014/main" id="{0C12CB56-E711-44D5-A3C4-B0035198B2D2}"/>
+          <p:cNvPr id="3" name="Прямоугольник 2">
+            <a:extLst>
+              <a:ext uri="{FF2B5EF4-FFF2-40B4-BE49-F238E27FC236}">
+                <a16:creationId xmlns:a16="http://schemas.microsoft.com/office/drawing/2014/main" id="{1284F120-D1F0-420B-BAC9-F7B9CB6D9FDF}"/>
+              </a:ext>
+            </a:extLst>
+          </p:cNvPr>
+          <p:cNvSpPr/>
+          <p:nvPr/>
+        </p:nvSpPr>
+        <p:spPr>
+          <a:xfrm>
+            <a:off x="139700" y="830549"/>
+            <a:ext cx="3389518" cy="707886"/>
+          </a:xfrm>
+          <a:prstGeom prst="rect">
+            <a:avLst/>
+          </a:prstGeom>
+        </p:spPr>
+        <p:txBody>
+          <a:bodyPr wrap="none">
+            <a:spAutoFit/>
+          </a:bodyPr>
+          <a:lstStyle/>
+          <a:p>
+            <a:r>
+              <a:rPr lang="en-US" sz="4000" dirty="0">
+                <a:hlinkClick r:id="rId2"/>
+              </a:rPr>
+              <a:t>https://cubic.tk</a:t>
+            </a:r>
+            <a:endParaRPr lang="ru-RU" sz="4000" dirty="0"/>
+          </a:p>
+        </p:txBody>
+      </p:sp>
+      <p:sp>
+        <p:nvSpPr>
+          <p:cNvPr id="4" name="TextBox 3">
+            <a:extLst>
+              <a:ext uri="{FF2B5EF4-FFF2-40B4-BE49-F238E27FC236}">
+                <a16:creationId xmlns:a16="http://schemas.microsoft.com/office/drawing/2014/main" id="{4E4FA668-243E-4A8C-978B-4D951CEC2927}"/>
               </a:ext>
             </a:extLst>
           </p:cNvPr>
@@ -4522,52 +4488,7 @@
           <a:p>
             <a:r>
               <a:rPr lang="ru-RU" sz="4000" dirty="0"/>
-              <a:t>Результаты работы/выводы</a:t>
-            </a:r>
-          </a:p>
-        </p:txBody>
-      </p:sp>
-      <p:sp>
-        <p:nvSpPr>
-          <p:cNvPr id="3" name="TextBox 2">
-            <a:extLst>
-              <a:ext uri="{FF2B5EF4-FFF2-40B4-BE49-F238E27FC236}">
-                <a16:creationId xmlns:a16="http://schemas.microsoft.com/office/drawing/2014/main" id="{960741A9-FFE5-47D8-9459-EE00B11D7339}"/>
-              </a:ext>
-            </a:extLst>
-          </p:cNvPr>
-          <p:cNvSpPr txBox="1"/>
-          <p:nvPr/>
-        </p:nvSpPr>
-        <p:spPr>
-          <a:xfrm>
-            <a:off x="139700" y="830549"/>
-            <a:ext cx="11912600" cy="1938992"/>
-          </a:xfrm>
-          <a:prstGeom prst="rect">
-            <a:avLst/>
-          </a:prstGeom>
-          <a:noFill/>
-        </p:spPr>
-        <p:txBody>
-          <a:bodyPr wrap="square" rtlCol="0">
-            <a:spAutoFit/>
-          </a:bodyPr>
-          <a:lstStyle/>
-          <a:p>
-            <a:r>
-              <a:rPr lang="ru-RU" sz="2400" dirty="0"/>
-              <a:t>Была создана и протестирована веб-игра, которая помогает людям развивать их мышление и позволяет приятно провести время.</a:t>
-            </a:r>
-            <a:endParaRPr lang="en-US" sz="2400" dirty="0"/>
-          </a:p>
-          <a:p>
-            <a:endParaRPr lang="ru-RU" sz="2400" dirty="0"/>
-          </a:p>
-          <a:p>
-            <a:r>
-              <a:rPr lang="ru-RU" sz="2400" dirty="0"/>
-              <a:t>В рамках проделанной работы создано ядро игры и сделан задел для дальнейшего наращивания функциональности проекта.</a:t>
+              <a:t>Демонстрация</a:t>
             </a:r>
           </a:p>
         </p:txBody>
@@ -4575,7 +4496,7 @@
     </p:spTree>
     <p:extLst>
       <p:ext uri="{BB962C8B-B14F-4D97-AF65-F5344CB8AC3E}">
-        <p14:creationId xmlns:p14="http://schemas.microsoft.com/office/powerpoint/2010/main" val="899048144"/>
+        <p14:creationId xmlns:p14="http://schemas.microsoft.com/office/powerpoint/2010/main" val="1371665637"/>
       </p:ext>
     </p:extLst>
   </p:cSld>
@@ -4607,6 +4528,116 @@
           <p:cNvPr id="2" name="TextBox 1">
             <a:extLst>
               <a:ext uri="{FF2B5EF4-FFF2-40B4-BE49-F238E27FC236}">
+                <a16:creationId xmlns:a16="http://schemas.microsoft.com/office/drawing/2014/main" id="{0C12CB56-E711-44D5-A3C4-B0035198B2D2}"/>
+              </a:ext>
+            </a:extLst>
+          </p:cNvPr>
+          <p:cNvSpPr txBox="1"/>
+          <p:nvPr/>
+        </p:nvSpPr>
+        <p:spPr>
+          <a:xfrm>
+            <a:off x="139700" y="122663"/>
+            <a:ext cx="12192000" cy="707886"/>
+          </a:xfrm>
+          <a:prstGeom prst="rect">
+            <a:avLst/>
+          </a:prstGeom>
+          <a:noFill/>
+        </p:spPr>
+        <p:txBody>
+          <a:bodyPr wrap="square" rtlCol="0">
+            <a:spAutoFit/>
+          </a:bodyPr>
+          <a:lstStyle/>
+          <a:p>
+            <a:r>
+              <a:rPr lang="ru-RU" sz="4000" dirty="0"/>
+              <a:t>Результаты работы/выводы</a:t>
+            </a:r>
+          </a:p>
+        </p:txBody>
+      </p:sp>
+      <p:sp>
+        <p:nvSpPr>
+          <p:cNvPr id="3" name="TextBox 2">
+            <a:extLst>
+              <a:ext uri="{FF2B5EF4-FFF2-40B4-BE49-F238E27FC236}">
+                <a16:creationId xmlns:a16="http://schemas.microsoft.com/office/drawing/2014/main" id="{960741A9-FFE5-47D8-9459-EE00B11D7339}"/>
+              </a:ext>
+            </a:extLst>
+          </p:cNvPr>
+          <p:cNvSpPr txBox="1"/>
+          <p:nvPr/>
+        </p:nvSpPr>
+        <p:spPr>
+          <a:xfrm>
+            <a:off x="139700" y="830549"/>
+            <a:ext cx="11912600" cy="1938992"/>
+          </a:xfrm>
+          <a:prstGeom prst="rect">
+            <a:avLst/>
+          </a:prstGeom>
+          <a:noFill/>
+        </p:spPr>
+        <p:txBody>
+          <a:bodyPr wrap="square" rtlCol="0">
+            <a:spAutoFit/>
+          </a:bodyPr>
+          <a:lstStyle/>
+          <a:p>
+            <a:r>
+              <a:rPr lang="ru-RU" sz="2400" dirty="0"/>
+              <a:t>Была создана и протестирована веб-игра, которая помогает людям развивать их мышление и позволяет приятно провести время.</a:t>
+            </a:r>
+            <a:endParaRPr lang="en-US" sz="2400" dirty="0"/>
+          </a:p>
+          <a:p>
+            <a:endParaRPr lang="ru-RU" sz="2400" dirty="0"/>
+          </a:p>
+          <a:p>
+            <a:r>
+              <a:rPr lang="ru-RU" sz="2400" dirty="0"/>
+              <a:t>В рамках проделанной работы создано ядро игры и сделан задел для дальнейшего наращивания функциональности проекта.</a:t>
+            </a:r>
+          </a:p>
+        </p:txBody>
+      </p:sp>
+    </p:spTree>
+    <p:extLst>
+      <p:ext uri="{BB962C8B-B14F-4D97-AF65-F5344CB8AC3E}">
+        <p14:creationId xmlns:p14="http://schemas.microsoft.com/office/powerpoint/2010/main" val="899048144"/>
+      </p:ext>
+    </p:extLst>
+  </p:cSld>
+  <p:clrMapOvr>
+    <a:masterClrMapping/>
+  </p:clrMapOvr>
+</p:sld>
+</file>
+
+<file path=ppt/slides/slide8.xml><?xml version="1.0" encoding="utf-8"?>
+<p:sld xmlns:a="http://schemas.openxmlformats.org/drawingml/2006/main" xmlns:r="http://schemas.openxmlformats.org/officeDocument/2006/relationships" xmlns:p="http://schemas.openxmlformats.org/presentationml/2006/main">
+  <p:cSld>
+    <p:spTree>
+      <p:nvGrpSpPr>
+        <p:cNvPr id="1" name=""/>
+        <p:cNvGrpSpPr/>
+        <p:nvPr/>
+      </p:nvGrpSpPr>
+      <p:grpSpPr>
+        <a:xfrm>
+          <a:off x="0" y="0"/>
+          <a:ext cx="0" cy="0"/>
+          <a:chOff x="0" y="0"/>
+          <a:chExt cx="0" cy="0"/>
+        </a:xfrm>
+      </p:grpSpPr>
+      <p:sp>
+        <p:nvSpPr>
+          <p:cNvPr id="2" name="TextBox 1">
+            <a:extLst>
+              <a:ext uri="{FF2B5EF4-FFF2-40B4-BE49-F238E27FC236}">
                 <a16:creationId xmlns:a16="http://schemas.microsoft.com/office/drawing/2014/main" id="{72F3E030-3199-469D-A3EE-5F3B0B42D5A5}"/>
               </a:ext>
             </a:extLst>
@@ -4836,7 +4867,7 @@
 </p:sld>
 </file>
 
-<file path=ppt/slides/slide8.xml><?xml version="1.0" encoding="utf-8"?>
+<file path=ppt/slides/slide9.xml><?xml version="1.0" encoding="utf-8"?>
 <p:sld xmlns:a="http://schemas.openxmlformats.org/drawingml/2006/main" xmlns:r="http://schemas.openxmlformats.org/officeDocument/2006/relationships" xmlns:p="http://schemas.openxmlformats.org/presentationml/2006/main">
   <p:cSld>
     <p:spTree>

</xml_diff>